<commit_message>
Leaflet QGIS Pokročilí Draft 0.1
</commit_message>
<xml_diff>
--- a/skoleni/skoleni-qgis-zakladni.pptx
+++ b/skoleni/skoleni-qgis-zakladni.pptx
@@ -3215,29 +3215,7 @@
                   </a:schemeClr>
                 </a:solidFill>
               </a:rPr>
-              <a:t>V tomto kurzu Vás naučíme samostatně </a:t>
-            </a:r>
-            <a:r>
-              <a:rPr lang="cs-CZ" sz="1100" dirty="0" smtClean="0">
-                <a:solidFill>
-                  <a:schemeClr val="tx1">
-                    <a:lumMod val="50000"/>
-                    <a:lumOff val="50000"/>
-                  </a:schemeClr>
-                </a:solidFill>
-              </a:rPr>
-              <a:t>pracovat s prostorovými informacemi v prostředí </a:t>
-            </a:r>
-            <a:r>
-              <a:rPr lang="cs-CZ" sz="1100" dirty="0" smtClean="0">
-                <a:solidFill>
-                  <a:schemeClr val="tx1">
-                    <a:lumMod val="50000"/>
-                    <a:lumOff val="50000"/>
-                  </a:schemeClr>
-                </a:solidFill>
-              </a:rPr>
-              <a:t>QGIS, vytvářet mapy a analyzovat data. Naučíte se pracovat s rastrovými a vektorovými daty včetně dat online a pracovat se zásuvnými moduly.</a:t>
+              <a:t>V tomto kurzu Vás naučíme samostatně pracovat s prostorovými informacemi v prostředí QGIS, vytvářet mapy a analyzovat data. Naučíte se pracovat s rastrovými a vektorovými daty včetně dat online a pracovat se zásuvnými moduly.</a:t>
             </a:r>
           </a:p>
         </p:txBody>
@@ -3388,10 +3366,10 @@
                   </a:schemeClr>
                 </a:solidFill>
               </a:rPr>
-              <a:t>  1000</a:t>
-            </a:r>
-            <a:r>
-              <a:rPr lang="cs-CZ" sz="1100" dirty="0" smtClean="0">
+              <a:t>  1000,- Kč student </a:t>
+            </a:r>
+            <a:r>
+              <a:rPr lang="cs-CZ" sz="900" dirty="0" smtClean="0">
                 <a:solidFill>
                   <a:schemeClr val="tx1">
                     <a:lumMod val="50000"/>
@@ -3399,62 +3377,7 @@
                   </a:schemeClr>
                 </a:solidFill>
               </a:rPr>
-              <a:t>,- </a:t>
-            </a:r>
-            <a:r>
-              <a:rPr lang="cs-CZ" sz="1100" dirty="0" smtClean="0">
-                <a:solidFill>
-                  <a:schemeClr val="tx1">
-                    <a:lumMod val="50000"/>
-                    <a:lumOff val="50000"/>
-                  </a:schemeClr>
-                </a:solidFill>
-              </a:rPr>
-              <a:t>Kč student </a:t>
-            </a:r>
-            <a:r>
-              <a:rPr lang="cs-CZ" sz="900" dirty="0" smtClean="0">
-                <a:solidFill>
-                  <a:schemeClr val="tx1">
-                    <a:lumMod val="50000"/>
-                    <a:lumOff val="50000"/>
-                  </a:schemeClr>
-                </a:solidFill>
-              </a:rPr>
-              <a:t>při </a:t>
-            </a:r>
-            <a:r>
-              <a:rPr lang="cs-CZ" sz="900" dirty="0" smtClean="0">
-                <a:solidFill>
-                  <a:schemeClr val="tx1">
-                    <a:lumMod val="50000"/>
-                    <a:lumOff val="50000"/>
-                  </a:schemeClr>
-                </a:solidFill>
-              </a:rPr>
-              <a:t>registraci </a:t>
-            </a:r>
-            <a:r>
-              <a:rPr lang="cs-CZ" sz="900" dirty="0" smtClean="0">
-                <a:solidFill>
-                  <a:schemeClr val="tx1">
-                    <a:lumMod val="50000"/>
-                    <a:lumOff val="50000"/>
-                  </a:schemeClr>
-                </a:solidFill>
-              </a:rPr>
-              <a:t>do 30.9</a:t>
-            </a:r>
-            <a:r>
-              <a:rPr lang="cs-CZ" sz="900" dirty="0" smtClean="0">
-                <a:solidFill>
-                  <a:schemeClr val="tx1">
-                    <a:lumMod val="50000"/>
-                    <a:lumOff val="50000"/>
-                  </a:schemeClr>
-                </a:solidFill>
-              </a:rPr>
-              <a:t>., maximálně 5 míst </a:t>
+              <a:t>při registraci do 30.9., maximálně 5 míst </a:t>
             </a:r>
           </a:p>
           <a:p>
@@ -3607,7 +3530,7 @@
         </p:nvSpPr>
         <p:spPr>
           <a:xfrm>
-            <a:off x="0" y="2708920"/>
+            <a:off x="72008" y="2708920"/>
             <a:ext cx="4211960" cy="288032"/>
           </a:xfrm>
           <a:prstGeom prst="rect">
@@ -3958,8 +3881,8 @@
         </p:blipFill>
         <p:spPr bwMode="auto">
           <a:xfrm>
-            <a:off x="4932040" y="4879888"/>
-            <a:ext cx="2520280" cy="1727143"/>
+            <a:off x="4932039" y="4365104"/>
+            <a:ext cx="3150733" cy="2159191"/>
           </a:xfrm>
           <a:prstGeom prst="rect">
             <a:avLst/>
@@ -4021,8 +3944,8 @@
         </p:nvSpPr>
         <p:spPr>
           <a:xfrm>
-            <a:off x="4644008" y="2132856"/>
-            <a:ext cx="4427984" cy="2808312"/>
+            <a:off x="4644008" y="1916832"/>
+            <a:ext cx="4427984" cy="2520280"/>
           </a:xfrm>
           <a:prstGeom prst="rect">
             <a:avLst/>
@@ -4074,18 +3997,7 @@
                   </a:schemeClr>
                 </a:solidFill>
               </a:rPr>
-              <a:t>Začínáme </a:t>
-            </a:r>
-            <a:r>
-              <a:rPr lang="cs-CZ" sz="1100" b="1" dirty="0" smtClean="0">
-                <a:solidFill>
-                  <a:schemeClr val="tx1">
-                    <a:lumMod val="50000"/>
-                    <a:lumOff val="50000"/>
-                  </a:schemeClr>
-                </a:solidFill>
-              </a:rPr>
-              <a:t>s QGIS:</a:t>
+              <a:t>Začínáme s QGIS:</a:t>
             </a:r>
             <a:r>
               <a:rPr lang="cs-CZ" sz="1100" dirty="0" smtClean="0">
@@ -4141,7 +4053,7 @@
           </a:p>
           <a:p>
             <a:r>
-              <a:rPr lang="cs-CZ" sz="1100" b="1" dirty="0" smtClean="0">
+              <a:rPr lang="cs-CZ" sz="1100" b="1" smtClean="0">
                 <a:solidFill>
                   <a:schemeClr val="tx1">
                     <a:lumMod val="50000"/>
@@ -4149,10 +4061,10 @@
                   </a:schemeClr>
                 </a:solidFill>
               </a:rPr>
-              <a:t>Práce s vektorovými daty:</a:t>
-            </a:r>
-            <a:r>
-              <a:rPr lang="cs-CZ" sz="1100" dirty="0" smtClean="0">
+              <a:t>Vektorovými data:</a:t>
+            </a:r>
+            <a:r>
+              <a:rPr lang="cs-CZ" sz="1100" smtClean="0">
                 <a:solidFill>
                   <a:schemeClr val="tx1">
                     <a:lumMod val="50000"/>
@@ -4160,7 +4072,18 @@
                   </a:schemeClr>
                 </a:solidFill>
               </a:rPr>
-              <a:t> Popisné informace, nastavení popisků a jejich klasifikace</a:t>
+              <a:t> </a:t>
+            </a:r>
+            <a:r>
+              <a:rPr lang="cs-CZ" sz="1100" dirty="0" smtClean="0">
+                <a:solidFill>
+                  <a:schemeClr val="tx1">
+                    <a:lumMod val="50000"/>
+                    <a:lumOff val="50000"/>
+                  </a:schemeClr>
+                </a:solidFill>
+              </a:rPr>
+              <a:t>Popisné informace, nastavení popisků a jejich klasifikace</a:t>
             </a:r>
             <a:endParaRPr lang="en-US" sz="1100" dirty="0" smtClean="0">
               <a:solidFill>
@@ -4192,18 +4115,7 @@
                   </a:schemeClr>
                 </a:solidFill>
               </a:rPr>
-              <a:t> Vytváření </a:t>
-            </a:r>
-            <a:r>
-              <a:rPr lang="cs-CZ" sz="1100" dirty="0" smtClean="0">
-                <a:solidFill>
-                  <a:schemeClr val="tx1">
-                    <a:lumMod val="50000"/>
-                    <a:lumOff val="50000"/>
-                  </a:schemeClr>
-                </a:solidFill>
-              </a:rPr>
-              <a:t>a nastavení mapové kompozice, tisk</a:t>
+              <a:t> Vytváření a nastavení mapové kompozice, tisk</a:t>
             </a:r>
             <a:endParaRPr lang="en-US" sz="1100" dirty="0" smtClean="0">
               <a:solidFill>
@@ -4343,10 +4255,10 @@
                   </a:schemeClr>
                 </a:solidFill>
               </a:rPr>
-              <a:t>, </a:t>
-            </a:r>
-            <a:r>
-              <a:rPr lang="cs-CZ" sz="1100" dirty="0" smtClean="0">
+              <a:t>, využití dat </a:t>
+            </a:r>
+            <a:r>
+              <a:rPr lang="en-US" sz="1100" dirty="0" smtClean="0">
                 <a:solidFill>
                   <a:schemeClr val="tx1">
                     <a:lumMod val="50000"/>
@@ -4354,10 +4266,10 @@
                   </a:schemeClr>
                 </a:solidFill>
               </a:rPr>
-              <a:t>využití dat </a:t>
-            </a:r>
-            <a:r>
-              <a:rPr lang="en-US" sz="1100" dirty="0" smtClean="0">
+              <a:t>Open Street Map </a:t>
+            </a:r>
+            <a:r>
+              <a:rPr lang="cs-CZ" sz="1100" dirty="0" smtClean="0">
                 <a:solidFill>
                   <a:schemeClr val="tx1">
                     <a:lumMod val="50000"/>
@@ -4365,10 +4277,10 @@
                   </a:schemeClr>
                 </a:solidFill>
               </a:rPr>
-              <a:t>Open Street Map </a:t>
-            </a:r>
-            <a:r>
-              <a:rPr lang="cs-CZ" sz="1100" dirty="0" smtClean="0">
+              <a:t>a </a:t>
+            </a:r>
+            <a:r>
+              <a:rPr lang="en-US" sz="1100" dirty="0" smtClean="0">
                 <a:solidFill>
                   <a:schemeClr val="tx1">
                     <a:lumMod val="50000"/>
@@ -4376,27 +4288,8 @@
                   </a:schemeClr>
                 </a:solidFill>
               </a:rPr>
-              <a:t>a </a:t>
-            </a:r>
-            <a:r>
-              <a:rPr lang="en-US" sz="1100" dirty="0" smtClean="0">
-                <a:solidFill>
-                  <a:schemeClr val="tx1">
-                    <a:lumMod val="50000"/>
-                    <a:lumOff val="50000"/>
-                  </a:schemeClr>
-                </a:solidFill>
-              </a:rPr>
               <a:t>Google</a:t>
             </a:r>
-            <a:endParaRPr lang="en-US" sz="1100" dirty="0" smtClean="0">
-              <a:solidFill>
-                <a:schemeClr val="tx1">
-                  <a:lumMod val="50000"/>
-                  <a:lumOff val="50000"/>
-                </a:schemeClr>
-              </a:solidFill>
-            </a:endParaRPr>
           </a:p>
           <a:p>
             <a:pPr algn="ctr"/>
@@ -4428,8 +4321,8 @@
         </p:blipFill>
         <p:spPr bwMode="auto">
           <a:xfrm>
-            <a:off x="7956376" y="5013176"/>
-            <a:ext cx="746207" cy="1417708"/>
+            <a:off x="7956376" y="4682055"/>
+            <a:ext cx="1008112" cy="1915298"/>
           </a:xfrm>
           <a:prstGeom prst="rect">
             <a:avLst/>

</xml_diff>